<commit_message>
add screenshots to bemutato
</commit_message>
<xml_diff>
--- a/Bemutató.pptx
+++ b/Bemutató.pptx
@@ -5,7 +5,7 @@
     <p:sldMasterId id="2147483874" r:id="rId1"/>
   </p:sldMasterIdLst>
   <p:notesMasterIdLst>
-    <p:notesMasterId r:id="rId12"/>
+    <p:notesMasterId r:id="rId13"/>
   </p:notesMasterIdLst>
   <p:sldIdLst>
     <p:sldId id="256" r:id="rId2"/>
@@ -17,7 +17,8 @@
     <p:sldId id="264" r:id="rId8"/>
     <p:sldId id="265" r:id="rId9"/>
     <p:sldId id="266" r:id="rId10"/>
-    <p:sldId id="267" r:id="rId11"/>
+    <p:sldId id="268" r:id="rId11"/>
+    <p:sldId id="267" r:id="rId12"/>
   </p:sldIdLst>
   <p:sldSz cx="12192000" cy="6858000"/>
   <p:notesSz cx="6858000" cy="9144000"/>
@@ -6671,6 +6672,399 @@
 </file>
 
 <file path=ppt/slides/slide10.xml><?xml version="1.0" encoding="utf-8"?>
+<p:sld xmlns:a="http://schemas.openxmlformats.org/drawingml/2006/main" xmlns:r="http://schemas.openxmlformats.org/officeDocument/2006/relationships" xmlns:p="http://schemas.openxmlformats.org/presentationml/2006/main">
+  <p:cSld>
+    <p:spTree>
+      <p:nvGrpSpPr>
+        <p:cNvPr id="1" name=""/>
+        <p:cNvGrpSpPr/>
+        <p:nvPr/>
+      </p:nvGrpSpPr>
+      <p:grpSpPr>
+        <a:xfrm>
+          <a:off x="0" y="0"/>
+          <a:ext cx="0" cy="0"/>
+          <a:chOff x="0" y="0"/>
+          <a:chExt cx="0" cy="0"/>
+        </a:xfrm>
+      </p:grpSpPr>
+      <p:pic>
+        <p:nvPicPr>
+          <p:cNvPr id="6" name="Picture 5">
+            <a:extLst>
+              <a:ext uri="{FF2B5EF4-FFF2-40B4-BE49-F238E27FC236}">
+                <a16:creationId xmlns:a16="http://schemas.microsoft.com/office/drawing/2014/main" id="{4635C807-332D-471A-B44B-34EE0A7BE005}"/>
+              </a:ext>
+            </a:extLst>
+          </p:cNvPr>
+          <p:cNvPicPr>
+            <a:picLocks noChangeAspect="1"/>
+          </p:cNvPicPr>
+          <p:nvPr/>
+        </p:nvPicPr>
+        <p:blipFill>
+          <a:blip r:embed="rId2"/>
+          <a:stretch>
+            <a:fillRect/>
+          </a:stretch>
+        </p:blipFill>
+        <p:spPr>
+          <a:xfrm>
+            <a:off x="148173" y="130200"/>
+            <a:ext cx="8145049" cy="4335268"/>
+          </a:xfrm>
+          <a:prstGeom prst="rect">
+            <a:avLst/>
+          </a:prstGeom>
+        </p:spPr>
+      </p:pic>
+      <p:pic>
+        <p:nvPicPr>
+          <p:cNvPr id="8" name="Picture 7">
+            <a:extLst>
+              <a:ext uri="{FF2B5EF4-FFF2-40B4-BE49-F238E27FC236}">
+                <a16:creationId xmlns:a16="http://schemas.microsoft.com/office/drawing/2014/main" id="{3C9ACEE5-6AA5-45AB-AD71-A27F35D3A0EC}"/>
+              </a:ext>
+            </a:extLst>
+          </p:cNvPr>
+          <p:cNvPicPr>
+            <a:picLocks noChangeAspect="1"/>
+          </p:cNvPicPr>
+          <p:nvPr/>
+        </p:nvPicPr>
+        <p:blipFill>
+          <a:blip r:embed="rId3"/>
+          <a:stretch>
+            <a:fillRect/>
+          </a:stretch>
+        </p:blipFill>
+        <p:spPr>
+          <a:xfrm>
+            <a:off x="742980" y="458674"/>
+            <a:ext cx="8859486" cy="4715533"/>
+          </a:xfrm>
+          <a:prstGeom prst="rect">
+            <a:avLst/>
+          </a:prstGeom>
+        </p:spPr>
+      </p:pic>
+      <p:pic>
+        <p:nvPicPr>
+          <p:cNvPr id="10" name="Picture 9">
+            <a:extLst>
+              <a:ext uri="{FF2B5EF4-FFF2-40B4-BE49-F238E27FC236}">
+                <a16:creationId xmlns:a16="http://schemas.microsoft.com/office/drawing/2014/main" id="{53CF3F35-F727-4905-89A0-FD3D7FB99A00}"/>
+              </a:ext>
+            </a:extLst>
+          </p:cNvPr>
+          <p:cNvPicPr>
+            <a:picLocks noChangeAspect="1"/>
+          </p:cNvPicPr>
+          <p:nvPr/>
+        </p:nvPicPr>
+        <p:blipFill>
+          <a:blip r:embed="rId4"/>
+          <a:stretch>
+            <a:fillRect/>
+          </a:stretch>
+        </p:blipFill>
+        <p:spPr>
+          <a:xfrm>
+            <a:off x="1666257" y="1071233"/>
+            <a:ext cx="8859486" cy="4715533"/>
+          </a:xfrm>
+          <a:prstGeom prst="rect">
+            <a:avLst/>
+          </a:prstGeom>
+        </p:spPr>
+      </p:pic>
+    </p:spTree>
+    <p:extLst>
+      <p:ext uri="{BB962C8B-B14F-4D97-AF65-F5344CB8AC3E}">
+        <p14:creationId xmlns:p14="http://schemas.microsoft.com/office/powerpoint/2010/main" val="2092155637"/>
+      </p:ext>
+    </p:extLst>
+  </p:cSld>
+  <p:clrMapOvr>
+    <a:masterClrMapping/>
+  </p:clrMapOvr>
+  <p:timing>
+    <p:tnLst>
+      <p:par>
+        <p:cTn id="1" dur="indefinite" restart="never" nodeType="tmRoot">
+          <p:childTnLst>
+            <p:seq concurrent="1" nextAc="seek">
+              <p:cTn id="2" dur="indefinite" nodeType="mainSeq">
+                <p:childTnLst>
+                  <p:par>
+                    <p:cTn id="3" fill="hold">
+                      <p:stCondLst>
+                        <p:cond delay="indefinite"/>
+                      </p:stCondLst>
+                      <p:childTnLst>
+                        <p:par>
+                          <p:cTn id="4" fill="hold">
+                            <p:stCondLst>
+                              <p:cond delay="0"/>
+                            </p:stCondLst>
+                            <p:childTnLst>
+                              <p:par>
+                                <p:cTn id="5" presetID="1" presetClass="entr" presetSubtype="0" fill="hold" nodeType="clickEffect">
+                                  <p:stCondLst>
+                                    <p:cond delay="0"/>
+                                  </p:stCondLst>
+                                  <p:childTnLst>
+                                    <p:set>
+                                      <p:cBhvr>
+                                        <p:cTn id="6" dur="1" fill="hold">
+                                          <p:stCondLst>
+                                            <p:cond delay="0"/>
+                                          </p:stCondLst>
+                                        </p:cTn>
+                                        <p:tgtEl>
+                                          <p:spTgt spid="6"/>
+                                        </p:tgtEl>
+                                        <p:attrNameLst>
+                                          <p:attrName>style.visibility</p:attrName>
+                                        </p:attrNameLst>
+                                      </p:cBhvr>
+                                      <p:to>
+                                        <p:strVal val="visible"/>
+                                      </p:to>
+                                    </p:set>
+                                  </p:childTnLst>
+                                </p:cTn>
+                              </p:par>
+                            </p:childTnLst>
+                          </p:cTn>
+                        </p:par>
+                      </p:childTnLst>
+                    </p:cTn>
+                  </p:par>
+                  <p:par>
+                    <p:cTn id="7" fill="hold">
+                      <p:stCondLst>
+                        <p:cond delay="indefinite"/>
+                      </p:stCondLst>
+                      <p:childTnLst>
+                        <p:par>
+                          <p:cTn id="8" fill="hold">
+                            <p:stCondLst>
+                              <p:cond delay="0"/>
+                            </p:stCondLst>
+                            <p:childTnLst>
+                              <p:par>
+                                <p:cTn id="9" presetID="42" presetClass="entr" presetSubtype="0" fill="hold" nodeType="clickEffect">
+                                  <p:stCondLst>
+                                    <p:cond delay="0"/>
+                                  </p:stCondLst>
+                                  <p:childTnLst>
+                                    <p:set>
+                                      <p:cBhvr>
+                                        <p:cTn id="10" dur="1" fill="hold">
+                                          <p:stCondLst>
+                                            <p:cond delay="0"/>
+                                          </p:stCondLst>
+                                        </p:cTn>
+                                        <p:tgtEl>
+                                          <p:spTgt spid="8"/>
+                                        </p:tgtEl>
+                                        <p:attrNameLst>
+                                          <p:attrName>style.visibility</p:attrName>
+                                        </p:attrNameLst>
+                                      </p:cBhvr>
+                                      <p:to>
+                                        <p:strVal val="visible"/>
+                                      </p:to>
+                                    </p:set>
+                                    <p:animEffect transition="in" filter="fade">
+                                      <p:cBhvr>
+                                        <p:cTn id="11" dur="1000"/>
+                                        <p:tgtEl>
+                                          <p:spTgt spid="8"/>
+                                        </p:tgtEl>
+                                      </p:cBhvr>
+                                    </p:animEffect>
+                                    <p:anim calcmode="lin" valueType="num">
+                                      <p:cBhvr>
+                                        <p:cTn id="12" dur="1000" fill="hold"/>
+                                        <p:tgtEl>
+                                          <p:spTgt spid="8"/>
+                                        </p:tgtEl>
+                                        <p:attrNameLst>
+                                          <p:attrName>ppt_x</p:attrName>
+                                        </p:attrNameLst>
+                                      </p:cBhvr>
+                                      <p:tavLst>
+                                        <p:tav tm="0">
+                                          <p:val>
+                                            <p:strVal val="#ppt_x"/>
+                                          </p:val>
+                                        </p:tav>
+                                        <p:tav tm="100000">
+                                          <p:val>
+                                            <p:strVal val="#ppt_x"/>
+                                          </p:val>
+                                        </p:tav>
+                                      </p:tavLst>
+                                    </p:anim>
+                                    <p:anim calcmode="lin" valueType="num">
+                                      <p:cBhvr>
+                                        <p:cTn id="13" dur="1000" fill="hold"/>
+                                        <p:tgtEl>
+                                          <p:spTgt spid="8"/>
+                                        </p:tgtEl>
+                                        <p:attrNameLst>
+                                          <p:attrName>ppt_y</p:attrName>
+                                        </p:attrNameLst>
+                                      </p:cBhvr>
+                                      <p:tavLst>
+                                        <p:tav tm="0">
+                                          <p:val>
+                                            <p:strVal val="#ppt_y+.1"/>
+                                          </p:val>
+                                        </p:tav>
+                                        <p:tav tm="100000">
+                                          <p:val>
+                                            <p:strVal val="#ppt_y"/>
+                                          </p:val>
+                                        </p:tav>
+                                      </p:tavLst>
+                                    </p:anim>
+                                  </p:childTnLst>
+                                </p:cTn>
+                              </p:par>
+                            </p:childTnLst>
+                          </p:cTn>
+                        </p:par>
+                      </p:childTnLst>
+                    </p:cTn>
+                  </p:par>
+                  <p:par>
+                    <p:cTn id="14" fill="hold">
+                      <p:stCondLst>
+                        <p:cond delay="indefinite"/>
+                      </p:stCondLst>
+                      <p:childTnLst>
+                        <p:par>
+                          <p:cTn id="15" fill="hold">
+                            <p:stCondLst>
+                              <p:cond delay="0"/>
+                            </p:stCondLst>
+                            <p:childTnLst>
+                              <p:par>
+                                <p:cTn id="16" presetID="42" presetClass="entr" presetSubtype="0" fill="hold" nodeType="clickEffect">
+                                  <p:stCondLst>
+                                    <p:cond delay="0"/>
+                                  </p:stCondLst>
+                                  <p:childTnLst>
+                                    <p:set>
+                                      <p:cBhvr>
+                                        <p:cTn id="17" dur="1" fill="hold">
+                                          <p:stCondLst>
+                                            <p:cond delay="0"/>
+                                          </p:stCondLst>
+                                        </p:cTn>
+                                        <p:tgtEl>
+                                          <p:spTgt spid="10"/>
+                                        </p:tgtEl>
+                                        <p:attrNameLst>
+                                          <p:attrName>style.visibility</p:attrName>
+                                        </p:attrNameLst>
+                                      </p:cBhvr>
+                                      <p:to>
+                                        <p:strVal val="visible"/>
+                                      </p:to>
+                                    </p:set>
+                                    <p:animEffect transition="in" filter="fade">
+                                      <p:cBhvr>
+                                        <p:cTn id="18" dur="1000"/>
+                                        <p:tgtEl>
+                                          <p:spTgt spid="10"/>
+                                        </p:tgtEl>
+                                      </p:cBhvr>
+                                    </p:animEffect>
+                                    <p:anim calcmode="lin" valueType="num">
+                                      <p:cBhvr>
+                                        <p:cTn id="19" dur="1000" fill="hold"/>
+                                        <p:tgtEl>
+                                          <p:spTgt spid="10"/>
+                                        </p:tgtEl>
+                                        <p:attrNameLst>
+                                          <p:attrName>ppt_x</p:attrName>
+                                        </p:attrNameLst>
+                                      </p:cBhvr>
+                                      <p:tavLst>
+                                        <p:tav tm="0">
+                                          <p:val>
+                                            <p:strVal val="#ppt_x"/>
+                                          </p:val>
+                                        </p:tav>
+                                        <p:tav tm="100000">
+                                          <p:val>
+                                            <p:strVal val="#ppt_x"/>
+                                          </p:val>
+                                        </p:tav>
+                                      </p:tavLst>
+                                    </p:anim>
+                                    <p:anim calcmode="lin" valueType="num">
+                                      <p:cBhvr>
+                                        <p:cTn id="20" dur="1000" fill="hold"/>
+                                        <p:tgtEl>
+                                          <p:spTgt spid="10"/>
+                                        </p:tgtEl>
+                                        <p:attrNameLst>
+                                          <p:attrName>ppt_y</p:attrName>
+                                        </p:attrNameLst>
+                                      </p:cBhvr>
+                                      <p:tavLst>
+                                        <p:tav tm="0">
+                                          <p:val>
+                                            <p:strVal val="#ppt_y+.1"/>
+                                          </p:val>
+                                        </p:tav>
+                                        <p:tav tm="100000">
+                                          <p:val>
+                                            <p:strVal val="#ppt_y"/>
+                                          </p:val>
+                                        </p:tav>
+                                      </p:tavLst>
+                                    </p:anim>
+                                  </p:childTnLst>
+                                </p:cTn>
+                              </p:par>
+                            </p:childTnLst>
+                          </p:cTn>
+                        </p:par>
+                      </p:childTnLst>
+                    </p:cTn>
+                  </p:par>
+                </p:childTnLst>
+              </p:cTn>
+              <p:prevCondLst>
+                <p:cond evt="onPrev" delay="0">
+                  <p:tgtEl>
+                    <p:sldTgt/>
+                  </p:tgtEl>
+                </p:cond>
+              </p:prevCondLst>
+              <p:nextCondLst>
+                <p:cond evt="onNext" delay="0">
+                  <p:tgtEl>
+                    <p:sldTgt/>
+                  </p:tgtEl>
+                </p:cond>
+              </p:nextCondLst>
+            </p:seq>
+          </p:childTnLst>
+        </p:cTn>
+      </p:par>
+    </p:tnLst>
+  </p:timing>
+</p:sld>
+</file>
+
+<file path=ppt/slides/slide11.xml><?xml version="1.0" encoding="utf-8"?>
 <p:sld xmlns:a="http://schemas.openxmlformats.org/drawingml/2006/main" xmlns:r="http://schemas.openxmlformats.org/officeDocument/2006/relationships" xmlns:p="http://schemas.openxmlformats.org/presentationml/2006/main">
   <p:cSld>
     <p:spTree>

</xml_diff>